<commit_message>
presentatie update, ik was nog iets vergeten
</commit_message>
<xml_diff>
--- a/docs/Amstelhaege.pptx
+++ b/docs/Amstelhaege.pptx
@@ -5154,15 +5154,7 @@
           <a:p>
             <a:r>
               <a:rPr lang="de-DE" sz="2000" dirty="0" smtClean="0"/>
-              <a:t>Extra </a:t>
-            </a:r>
-            <a:r>
-              <a:rPr lang="de-DE" sz="2000" dirty="0" smtClean="0"/>
-              <a:t>land </a:t>
-            </a:r>
-            <a:r>
-              <a:rPr lang="de-DE" sz="2000" dirty="0" smtClean="0"/>
-              <a:t>representatie als „grid“</a:t>
+              <a:t>Extra land representatie als „grid“</a:t>
             </a:r>
           </a:p>
         </p:txBody>
@@ -5503,7 +5495,6 @@
               <a:rPr lang="de-DE" sz="2800" dirty="0" smtClean="0"/>
               <a:t>Amstelheage</a:t>
             </a:r>
-            <a:endParaRPr lang="de-DE" sz="2800" dirty="0" smtClean="0"/>
           </a:p>
           <a:p>
             <a:pPr marL="457200" indent="-457200">
@@ -5519,11 +5510,7 @@
             </a:pPr>
             <a:r>
               <a:rPr lang="de-DE" sz="2800" dirty="0" smtClean="0"/>
-              <a:t>Wat </a:t>
-            </a:r>
-            <a:r>
-              <a:rPr lang="de-DE" sz="2800" dirty="0" smtClean="0"/>
-              <a:t>we tot nu toe hebben</a:t>
+              <a:t>Wat we tot nu toe hebben</a:t>
             </a:r>
           </a:p>
           <a:p>
@@ -5710,7 +5697,7 @@
       </p:sp>
       <p:pic>
         <p:nvPicPr>
-          <p:cNvPr id="7" name="Picture 6"/>
+          <p:cNvPr id="4" name="Picture 3"/>
           <p:cNvPicPr>
             <a:picLocks noChangeAspect="1"/>
           </p:cNvPicPr>
@@ -5730,7 +5717,7 @@
         </p:blipFill>
         <p:spPr>
           <a:xfrm>
-            <a:off x="611560" y="2564904"/>
+            <a:off x="467544" y="2636912"/>
             <a:ext cx="3543300" cy="2946400"/>
           </a:xfrm>
           <a:prstGeom prst="rect">
@@ -5740,7 +5727,7 @@
       </p:pic>
       <p:pic>
         <p:nvPicPr>
-          <p:cNvPr id="8" name="Picture 7"/>
+          <p:cNvPr id="6" name="Picture 5"/>
           <p:cNvPicPr>
             <a:picLocks noChangeAspect="1"/>
           </p:cNvPicPr>
@@ -5760,7 +5747,7 @@
         </p:blipFill>
         <p:spPr>
           <a:xfrm>
-            <a:off x="4932040" y="2564904"/>
+            <a:off x="5076056" y="2636912"/>
             <a:ext cx="3543300" cy="2946400"/>
           </a:xfrm>
           <a:prstGeom prst="rect">
@@ -5849,7 +5836,7 @@
         <p:spPr>
           <a:xfrm>
             <a:off x="296652" y="2276872"/>
-            <a:ext cx="8550696" cy="2554545"/>
+            <a:ext cx="8550696" cy="3170099"/>
           </a:xfrm>
           <a:prstGeom prst="rect">
             <a:avLst/>
@@ -5882,8 +5869,22 @@
           <a:p>
             <a:r>
               <a:rPr lang="de-DE" sz="2000" dirty="0" smtClean="0"/>
-              <a:t>Verschillende parameters (bv temperatuur) testen en beste kiezen</a:t>
-            </a:r>
+              <a:t>Verschillende parameters (bv temperatuur) testen en beste </a:t>
+            </a:r>
+            <a:r>
+              <a:rPr lang="de-DE" sz="2000" dirty="0" smtClean="0"/>
+              <a:t>kiezen</a:t>
+            </a:r>
+          </a:p>
+          <a:p>
+            <a:endParaRPr lang="de-DE" sz="2000" dirty="0"/>
+          </a:p>
+          <a:p>
+            <a:r>
+              <a:rPr lang="de-DE" sz="2000" dirty="0" smtClean="0"/>
+              <a:t>Huizen overlap</a:t>
+            </a:r>
+            <a:endParaRPr lang="de-DE" sz="2000" dirty="0" smtClean="0"/>
           </a:p>
           <a:p>
             <a:endParaRPr lang="de-DE" sz="2000" dirty="0"/>

</xml_diff>